<commit_message>
ASM PPT also present with documents
</commit_message>
<xml_diff>
--- a/Asianpaints_ASM_PPT.pptx
+++ b/Asianpaints_ASM_PPT.pptx
@@ -11163,56 +11163,7 @@
                 <a:ea typeface="Cambria Math" pitchFamily="18" charset="0"/>
                 <a:cs typeface="+mj-cs"/>
               </a:rPr>
-              <a:t>     </a:t>
-            </a:r>
-            <a:r>
-              <a:rPr lang="en-US" sz="3700" b="1" dirty="0" smtClean="0">
-                <a:ln w="0"/>
-                <a:gradFill flip="none">
-                  <a:gsLst>
-                    <a:gs pos="0">
-                      <a:schemeClr val="accent1">
-                        <a:tint val="75000"/>
-                        <a:shade val="75000"/>
-                        <a:satMod val="170000"/>
-                      </a:schemeClr>
-                    </a:gs>
-                    <a:gs pos="49000">
-                      <a:schemeClr val="accent1">
-                        <a:tint val="88000"/>
-                        <a:shade val="65000"/>
-                        <a:satMod val="172000"/>
-                      </a:schemeClr>
-                    </a:gs>
-                    <a:gs pos="50000">
-                      <a:schemeClr val="accent1">
-                        <a:shade val="65000"/>
-                        <a:satMod val="130000"/>
-                      </a:schemeClr>
-                    </a:gs>
-                    <a:gs pos="92000">
-                      <a:schemeClr val="accent1">
-                        <a:shade val="50000"/>
-                        <a:satMod val="120000"/>
-                      </a:schemeClr>
-                    </a:gs>
-                    <a:gs pos="100000">
-                      <a:schemeClr val="accent1">
-                        <a:shade val="48000"/>
-                        <a:satMod val="120000"/>
-                      </a:schemeClr>
-                    </a:gs>
-                  </a:gsLst>
-                  <a:lin ang="5400000"/>
-                </a:gradFill>
-                <a:effectLst>
-                  <a:reflection blurRad="12700" stA="50000" endPos="50000" dist="5000" dir="5400000" sy="-100000" rotWithShape="0"/>
-                </a:effectLst>
-                <a:latin typeface="Cambria Math" pitchFamily="18" charset="0"/>
-                <a:ea typeface="Cambria Math" pitchFamily="18" charset="0"/>
-                <a:cs typeface="+mj-cs"/>
-              </a:rPr>
-              <a:t>Assisted Service Module</a:t>
+              <a:t>     Assisted Service Module</a:t>
             </a:r>
             <a:endParaRPr kumimoji="0" lang="en-US" sz="3700" b="1" i="0" u="none" strike="noStrike" kern="1200" normalizeH="0" baseline="0" noProof="0" dirty="0">
               <a:ln w="0"/>
@@ -11317,13 +11268,26 @@
               <a:defRPr/>
             </a:pPr>
             <a:r>
-              <a:rPr lang="sv-SE" sz="1600" dirty="0" smtClean="0">
+              <a:rPr lang="sv-SE" sz="1600" smtClean="0">
                 <a:latin typeface="Arial" pitchFamily="34" charset="0"/>
                 <a:ea typeface="Cambria Math" pitchFamily="18" charset="0"/>
                 <a:cs typeface="Arial" pitchFamily="34" charset="0"/>
               </a:rPr>
-              <a:t>Presented by,</a:t>
-            </a:r>
+              <a:t>Presented </a:t>
+            </a:r>
+            <a:r>
+              <a:rPr lang="sv-SE" sz="1600" smtClean="0">
+                <a:latin typeface="Arial" pitchFamily="34" charset="0"/>
+                <a:ea typeface="Cambria Math" pitchFamily="18" charset="0"/>
+                <a:cs typeface="Arial" pitchFamily="34" charset="0"/>
+              </a:rPr>
+              <a:t>by</a:t>
+            </a:r>
+            <a:endParaRPr lang="sv-SE" sz="1600" dirty="0" smtClean="0">
+              <a:latin typeface="Arial" pitchFamily="34" charset="0"/>
+              <a:ea typeface="Cambria Math" pitchFamily="18" charset="0"/>
+              <a:cs typeface="Arial" pitchFamily="34" charset="0"/>
+            </a:endParaRPr>
           </a:p>
           <a:p>
             <a:pPr marL="232693" marR="0" lvl="0" indent="-232693" algn="r" defTabSz="608790" rtl="0" eaLnBrk="1" fontAlgn="base" latinLnBrk="0" hangingPunct="1">
@@ -13349,21 +13313,7 @@
                 <a:latin typeface="Calibri" pitchFamily="34" charset="0"/>
                 <a:cs typeface="Calibri" pitchFamily="34" charset="0"/>
               </a:rPr>
-              <a:t>It enables </a:t>
-            </a:r>
-            <a:r>
-              <a:rPr lang="en-US" sz="1600" dirty="0">
-                <a:latin typeface="Calibri" pitchFamily="34" charset="0"/>
-                <a:cs typeface="Calibri" pitchFamily="34" charset="0"/>
-              </a:rPr>
-              <a:t>ASM employees to provide time customer sales </a:t>
-            </a:r>
-            <a:r>
-              <a:rPr lang="en-US" sz="1600" dirty="0">
-                <a:latin typeface="Calibri" pitchFamily="34" charset="0"/>
-                <a:cs typeface="Calibri" pitchFamily="34" charset="0"/>
-              </a:rPr>
-              <a:t>support to the customer.</a:t>
+              <a:t>It enables ASM employees to provide time customer sales support to the customer.</a:t>
             </a:r>
           </a:p>
           <a:p>
@@ -13404,49 +13354,7 @@
                 <a:latin typeface="Calibri" pitchFamily="34" charset="0"/>
                 <a:cs typeface="Calibri" pitchFamily="34" charset="0"/>
               </a:rPr>
-              <a:t>It allows </a:t>
-            </a:r>
-            <a:r>
-              <a:rPr lang="en-US" sz="1600" dirty="0">
-                <a:latin typeface="Calibri" pitchFamily="34" charset="0"/>
-                <a:cs typeface="Calibri" pitchFamily="34" charset="0"/>
-              </a:rPr>
-              <a:t>a customer to finish </a:t>
-            </a:r>
-            <a:r>
-              <a:rPr lang="en-US" sz="1600" dirty="0">
-                <a:latin typeface="Calibri" pitchFamily="34" charset="0"/>
-                <a:cs typeface="Calibri" pitchFamily="34" charset="0"/>
-              </a:rPr>
-              <a:t>remainder </a:t>
-            </a:r>
-            <a:r>
-              <a:rPr lang="en-US" sz="1600" dirty="0">
-                <a:latin typeface="Calibri" pitchFamily="34" charset="0"/>
-                <a:cs typeface="Calibri" pitchFamily="34" charset="0"/>
-              </a:rPr>
-              <a:t>of their </a:t>
-            </a:r>
-            <a:r>
-              <a:rPr lang="en-US" sz="1600" dirty="0">
-                <a:latin typeface="Calibri" pitchFamily="34" charset="0"/>
-                <a:cs typeface="Calibri" pitchFamily="34" charset="0"/>
-              </a:rPr>
-              <a:t>work, </a:t>
-            </a:r>
-            <a:r>
-              <a:rPr lang="en-US" sz="1600" dirty="0">
-                <a:latin typeface="Calibri" pitchFamily="34" charset="0"/>
-                <a:cs typeface="Calibri" pitchFamily="34" charset="0"/>
-              </a:rPr>
-              <a:t>by pairing them with customer sales and service support personnel in real-time using the same storefront, with little additional effort</a:t>
-            </a:r>
-            <a:r>
-              <a:rPr lang="en-US" sz="1600" dirty="0">
-                <a:latin typeface="Calibri" pitchFamily="34" charset="0"/>
-                <a:cs typeface="Calibri" pitchFamily="34" charset="0"/>
-              </a:rPr>
-              <a:t>.</a:t>
+              <a:t>It allows a customer to finish remainder of their work, by pairing them with customer sales and service support personnel in real-time using the same storefront, with little additional effort.</a:t>
             </a:r>
           </a:p>
           <a:p>
@@ -13494,61 +13402,8 @@
                 <a:latin typeface="Calibri" pitchFamily="34" charset="0"/>
                 <a:cs typeface="Calibri" pitchFamily="34" charset="0"/>
               </a:rPr>
-              <a:t>, </a:t>
-            </a:r>
-            <a:r>
-              <a:rPr lang="en-US" sz="1600" dirty="0">
-                <a:latin typeface="Calibri" pitchFamily="34" charset="0"/>
-                <a:cs typeface="Calibri" pitchFamily="34" charset="0"/>
-              </a:rPr>
-              <a:t>When </a:t>
-            </a:r>
-            <a:r>
-              <a:rPr lang="en-US" sz="1600" dirty="0">
-                <a:latin typeface="Calibri" pitchFamily="34" charset="0"/>
-                <a:cs typeface="Calibri" pitchFamily="34" charset="0"/>
-              </a:rPr>
-              <a:t>a customer gets stuck with making a purchase </a:t>
-            </a:r>
-            <a:r>
-              <a:rPr lang="en-US" sz="1600" dirty="0">
-                <a:latin typeface="Calibri" pitchFamily="34" charset="0"/>
-                <a:cs typeface="Calibri" pitchFamily="34" charset="0"/>
-              </a:rPr>
-              <a:t>their </a:t>
-            </a:r>
-            <a:r>
-              <a:rPr lang="en-US" sz="1600" dirty="0">
-                <a:latin typeface="Calibri" pitchFamily="34" charset="0"/>
-                <a:cs typeface="Calibri" pitchFamily="34" charset="0"/>
-              </a:rPr>
-              <a:t>account, they contact customer sales and service support </a:t>
-            </a:r>
-            <a:r>
-              <a:rPr lang="en-US" sz="1600" dirty="0">
-                <a:latin typeface="Calibri" pitchFamily="34" charset="0"/>
-                <a:cs typeface="Calibri" pitchFamily="34" charset="0"/>
-              </a:rPr>
-              <a:t>person </a:t>
-            </a:r>
-            <a:r>
-              <a:rPr lang="en-US" sz="1600" dirty="0">
-                <a:latin typeface="Calibri" pitchFamily="34" charset="0"/>
-                <a:cs typeface="Calibri" pitchFamily="34" charset="0"/>
-              </a:rPr>
-              <a:t>and give them their cart ID number or account </a:t>
-            </a:r>
-            <a:r>
-              <a:rPr lang="en-US" sz="1600" dirty="0">
-                <a:latin typeface="Calibri" pitchFamily="34" charset="0"/>
-                <a:cs typeface="Calibri" pitchFamily="34" charset="0"/>
-              </a:rPr>
-              <a:t>name.</a:t>
-            </a:r>
-            <a:endParaRPr lang="en-US" sz="1600" dirty="0">
-              <a:latin typeface="Calibri" pitchFamily="34" charset="0"/>
-              <a:cs typeface="Calibri" pitchFamily="34" charset="0"/>
-            </a:endParaRPr>
+              <a:t>, When a customer gets stuck with making a purchase their account, they contact customer sales and service support person and give them their cart ID number or account name.</a:t>
+            </a:r>
           </a:p>
           <a:p>
             <a:pPr marL="514350" indent="-285750" defTabSz="608790" fontAlgn="base">
@@ -13588,21 +13443,7 @@
                 <a:latin typeface="Calibri" pitchFamily="34" charset="0"/>
                 <a:cs typeface="Calibri" pitchFamily="34" charset="0"/>
               </a:rPr>
-              <a:t>In </a:t>
-            </a:r>
-            <a:r>
-              <a:rPr lang="en-US" sz="1600" dirty="0">
-                <a:latin typeface="Calibri" pitchFamily="34" charset="0"/>
-                <a:cs typeface="Calibri" pitchFamily="34" charset="0"/>
-              </a:rPr>
-              <a:t>simple term, we can say it is set forms that are launched and set up on our storefront</a:t>
-            </a:r>
-            <a:r>
-              <a:rPr lang="en-US" sz="1600" dirty="0">
-                <a:latin typeface="Calibri" pitchFamily="34" charset="0"/>
-                <a:cs typeface="Calibri" pitchFamily="34" charset="0"/>
-              </a:rPr>
-              <a:t>.</a:t>
+              <a:t>In simple term, we can say it is set forms that are launched and set up on our storefront.</a:t>
             </a:r>
           </a:p>
           <a:p>
@@ -14001,13 +13842,6 @@
                 <a:ea typeface="Cambria Math" pitchFamily="18" charset="0"/>
               </a:rPr>
               <a:t>WHAT DOES IT DO?</a:t>
-            </a:r>
-            <a:r>
-              <a:rPr lang="en-US" dirty="0" smtClean="0">
-                <a:latin typeface="Cambria Math" pitchFamily="18" charset="0"/>
-                <a:ea typeface="Cambria Math" pitchFamily="18" charset="0"/>
-              </a:rPr>
-              <a:t/>
             </a:r>
             <a:br>
               <a:rPr lang="en-US" dirty="0" smtClean="0">
@@ -14780,14 +14614,7 @@
                 <a:latin typeface="Calibri" pitchFamily="34" charset="0"/>
                 <a:cs typeface="Calibri" pitchFamily="34" charset="0"/>
               </a:rPr>
-              <a:t>Firstly by providing sales and service support using same storefront view for customer users. Provides seamless Omni-commerce customer sales and service experience</a:t>
-            </a:r>
-            <a:r>
-              <a:rPr lang="en-US" sz="1600" dirty="0">
-                <a:latin typeface="Calibri" pitchFamily="34" charset="0"/>
-                <a:cs typeface="Calibri" pitchFamily="34" charset="0"/>
-              </a:rPr>
-              <a:t>.</a:t>
+              <a:t>Firstly by providing sales and service support using same storefront view for customer users. Provides seamless Omni-commerce customer sales and service experience.</a:t>
             </a:r>
           </a:p>
           <a:p>

</xml_diff>